<commit_message>
MongoDB - Exercicio 2
</commit_message>
<xml_diff>
--- a/MongoDB/MongoDB - Exercício 2.pptx
+++ b/MongoDB/MongoDB - Exercício 2.pptx
@@ -6,6 +6,10 @@
   </p:sldMasterIdLst>
   <p:sldIdLst>
     <p:sldId id="257" r:id="rId2"/>
+    <p:sldId id="258" r:id="rId3"/>
+    <p:sldId id="259" r:id="rId4"/>
+    <p:sldId id="260" r:id="rId5"/>
+    <p:sldId id="261" r:id="rId6"/>
   </p:sldIdLst>
   <p:sldSz cx="12192000" cy="6858000"/>
   <p:notesSz cx="6858000" cy="9144000"/>
@@ -2969,30 +2973,32 @@
           <a:chExt cx="0" cy="0"/>
         </a:xfrm>
       </p:grpSpPr>
-      <p:sp>
-        <p:nvSpPr>
-          <p:cNvPr id="3" name="Content Placeholder 2"/>
-          <p:cNvSpPr>
-            <a:spLocks noGrp="1"/>
-          </p:cNvSpPr>
+      <p:pic>
+        <p:nvPicPr>
+          <p:cNvPr id="2" name="Content Placeholder 1"/>
+          <p:cNvPicPr>
+            <a:picLocks noGrp="1" noChangeAspect="1"/>
+          </p:cNvPicPr>
           <p:nvPr>
             <p:ph idx="1"/>
           </p:nvPr>
-        </p:nvSpPr>
+        </p:nvPicPr>
+        <p:blipFill>
+          <a:blip r:embed="rId2"/>
+          <a:stretch>
+            <a:fillRect/>
+          </a:stretch>
+        </p:blipFill>
         <p:spPr>
           <a:xfrm>
-            <a:off x="0" y="0"/>
-            <a:ext cx="12192000" cy="6858000"/>
+            <a:off x="842962" y="385762"/>
+            <a:ext cx="10506075" cy="6086475"/>
           </a:xfrm>
+          <a:prstGeom prst="rect">
+            <a:avLst/>
+          </a:prstGeom>
         </p:spPr>
-        <p:txBody>
-          <a:bodyPr/>
-          <a:lstStyle/>
-          <a:p>
-            <a:endParaRPr lang="en-US" dirty="0"/>
-          </a:p>
-        </p:txBody>
-      </p:sp>
+      </p:pic>
       <p:sp>
         <p:nvSpPr>
           <p:cNvPr id="5" name="Rectangle 4"/>
@@ -3001,8 +3007,8 @@
         </p:nvSpPr>
         <p:spPr>
           <a:xfrm>
-            <a:off x="-681038" y="1410789"/>
-            <a:ext cx="879566" cy="226423"/>
+            <a:off x="842961" y="2238103"/>
+            <a:ext cx="10304009" cy="435428"/>
           </a:xfrm>
           <a:prstGeom prst="rect">
             <a:avLst/>
@@ -3039,10 +3045,724 @@
           </a:p>
         </p:txBody>
       </p:sp>
+      <p:sp>
+        <p:nvSpPr>
+          <p:cNvPr id="6" name="Rectangle 5"/>
+          <p:cNvSpPr/>
+          <p:nvPr/>
+        </p:nvSpPr>
+        <p:spPr>
+          <a:xfrm>
+            <a:off x="842960" y="3211285"/>
+            <a:ext cx="10304009" cy="435428"/>
+          </a:xfrm>
+          <a:prstGeom prst="rect">
+            <a:avLst/>
+          </a:prstGeom>
+          <a:solidFill>
+            <a:schemeClr val="accent4">
+              <a:alpha val="50000"/>
+            </a:schemeClr>
+          </a:solidFill>
+          <a:ln>
+            <a:noFill/>
+          </a:ln>
+        </p:spPr>
+        <p:style>
+          <a:lnRef idx="0">
+            <a:scrgbClr r="0" g="0" b="0"/>
+          </a:lnRef>
+          <a:fillRef idx="0">
+            <a:scrgbClr r="0" g="0" b="0"/>
+          </a:fillRef>
+          <a:effectRef idx="0">
+            <a:scrgbClr r="0" g="0" b="0"/>
+          </a:effectRef>
+          <a:fontRef idx="minor">
+            <a:schemeClr val="lt1"/>
+          </a:fontRef>
+        </p:style>
+        <p:txBody>
+          <a:bodyPr rtlCol="0" anchor="ctr"/>
+          <a:lstStyle/>
+          <a:p>
+            <a:pPr algn="ctr"/>
+            <a:endParaRPr lang="en-US" dirty="0"/>
+          </a:p>
+        </p:txBody>
+      </p:sp>
     </p:spTree>
     <p:extLst>
       <p:ext uri="{BB962C8B-B14F-4D97-AF65-F5344CB8AC3E}">
         <p14:creationId xmlns:p14="http://schemas.microsoft.com/office/powerpoint/2010/main" val="288423390"/>
+      </p:ext>
+    </p:extLst>
+  </p:cSld>
+  <p:clrMapOvr>
+    <a:masterClrMapping/>
+  </p:clrMapOvr>
+  <p:timing>
+    <p:tnLst>
+      <p:par>
+        <p:cTn id="1" dur="indefinite" restart="never" nodeType="tmRoot"/>
+      </p:par>
+    </p:tnLst>
+  </p:timing>
+</p:sld>
+</file>
+
+<file path=ppt/slides/slide2.xml><?xml version="1.0" encoding="utf-8"?>
+<p:sld xmlns:a="http://schemas.openxmlformats.org/drawingml/2006/main" xmlns:r="http://schemas.openxmlformats.org/officeDocument/2006/relationships" xmlns:p="http://schemas.openxmlformats.org/presentationml/2006/main">
+  <p:cSld>
+    <p:spTree>
+      <p:nvGrpSpPr>
+        <p:cNvPr id="1" name=""/>
+        <p:cNvGrpSpPr/>
+        <p:nvPr/>
+      </p:nvGrpSpPr>
+      <p:grpSpPr>
+        <a:xfrm>
+          <a:off x="0" y="0"/>
+          <a:ext cx="0" cy="0"/>
+          <a:chOff x="0" y="0"/>
+          <a:chExt cx="0" cy="0"/>
+        </a:xfrm>
+      </p:grpSpPr>
+      <p:pic>
+        <p:nvPicPr>
+          <p:cNvPr id="2" name="Content Placeholder 1"/>
+          <p:cNvPicPr>
+            <a:picLocks noGrp="1" noChangeAspect="1"/>
+          </p:cNvPicPr>
+          <p:nvPr>
+            <p:ph idx="1"/>
+          </p:nvPr>
+        </p:nvPicPr>
+        <p:blipFill>
+          <a:blip r:embed="rId2"/>
+          <a:stretch>
+            <a:fillRect/>
+          </a:stretch>
+        </p:blipFill>
+        <p:spPr>
+          <a:xfrm>
+            <a:off x="842962" y="385762"/>
+            <a:ext cx="10506075" cy="6086475"/>
+          </a:xfrm>
+          <a:prstGeom prst="rect">
+            <a:avLst/>
+          </a:prstGeom>
+        </p:spPr>
+      </p:pic>
+      <p:sp>
+        <p:nvSpPr>
+          <p:cNvPr id="5" name="Rectangle 4"/>
+          <p:cNvSpPr/>
+          <p:nvPr/>
+        </p:nvSpPr>
+        <p:spPr>
+          <a:xfrm>
+            <a:off x="851670" y="1306286"/>
+            <a:ext cx="4660855" cy="209005"/>
+          </a:xfrm>
+          <a:prstGeom prst="rect">
+            <a:avLst/>
+          </a:prstGeom>
+          <a:solidFill>
+            <a:schemeClr val="accent4">
+              <a:alpha val="50000"/>
+            </a:schemeClr>
+          </a:solidFill>
+          <a:ln>
+            <a:noFill/>
+          </a:ln>
+        </p:spPr>
+        <p:style>
+          <a:lnRef idx="0">
+            <a:scrgbClr r="0" g="0" b="0"/>
+          </a:lnRef>
+          <a:fillRef idx="0">
+            <a:scrgbClr r="0" g="0" b="0"/>
+          </a:fillRef>
+          <a:effectRef idx="0">
+            <a:scrgbClr r="0" g="0" b="0"/>
+          </a:effectRef>
+          <a:fontRef idx="minor">
+            <a:schemeClr val="lt1"/>
+          </a:fontRef>
+        </p:style>
+        <p:txBody>
+          <a:bodyPr rtlCol="0" anchor="ctr"/>
+          <a:lstStyle/>
+          <a:p>
+            <a:pPr algn="ctr"/>
+            <a:endParaRPr lang="en-US" dirty="0"/>
+          </a:p>
+        </p:txBody>
+      </p:sp>
+      <p:sp>
+        <p:nvSpPr>
+          <p:cNvPr id="6" name="Rectangle 5"/>
+          <p:cNvSpPr/>
+          <p:nvPr/>
+        </p:nvSpPr>
+        <p:spPr>
+          <a:xfrm>
+            <a:off x="842962" y="2634343"/>
+            <a:ext cx="4817609" cy="248194"/>
+          </a:xfrm>
+          <a:prstGeom prst="rect">
+            <a:avLst/>
+          </a:prstGeom>
+          <a:solidFill>
+            <a:schemeClr val="accent4">
+              <a:alpha val="50000"/>
+            </a:schemeClr>
+          </a:solidFill>
+          <a:ln>
+            <a:noFill/>
+          </a:ln>
+        </p:spPr>
+        <p:style>
+          <a:lnRef idx="0">
+            <a:scrgbClr r="0" g="0" b="0"/>
+          </a:lnRef>
+          <a:fillRef idx="0">
+            <a:scrgbClr r="0" g="0" b="0"/>
+          </a:fillRef>
+          <a:effectRef idx="0">
+            <a:scrgbClr r="0" g="0" b="0"/>
+          </a:effectRef>
+          <a:fontRef idx="minor">
+            <a:schemeClr val="lt1"/>
+          </a:fontRef>
+        </p:style>
+        <p:txBody>
+          <a:bodyPr rtlCol="0" anchor="ctr"/>
+          <a:lstStyle/>
+          <a:p>
+            <a:pPr algn="ctr"/>
+            <a:endParaRPr lang="en-US" dirty="0"/>
+          </a:p>
+        </p:txBody>
+      </p:sp>
+      <p:sp>
+        <p:nvSpPr>
+          <p:cNvPr id="7" name="Rectangle 6"/>
+          <p:cNvSpPr/>
+          <p:nvPr/>
+        </p:nvSpPr>
+        <p:spPr>
+          <a:xfrm>
+            <a:off x="851671" y="3984171"/>
+            <a:ext cx="2353084" cy="222069"/>
+          </a:xfrm>
+          <a:prstGeom prst="rect">
+            <a:avLst/>
+          </a:prstGeom>
+          <a:solidFill>
+            <a:schemeClr val="accent4">
+              <a:alpha val="50000"/>
+            </a:schemeClr>
+          </a:solidFill>
+          <a:ln>
+            <a:noFill/>
+          </a:ln>
+        </p:spPr>
+        <p:style>
+          <a:lnRef idx="0">
+            <a:scrgbClr r="0" g="0" b="0"/>
+          </a:lnRef>
+          <a:fillRef idx="0">
+            <a:scrgbClr r="0" g="0" b="0"/>
+          </a:fillRef>
+          <a:effectRef idx="0">
+            <a:scrgbClr r="0" g="0" b="0"/>
+          </a:effectRef>
+          <a:fontRef idx="minor">
+            <a:schemeClr val="lt1"/>
+          </a:fontRef>
+        </p:style>
+        <p:txBody>
+          <a:bodyPr rtlCol="0" anchor="ctr"/>
+          <a:lstStyle/>
+          <a:p>
+            <a:pPr algn="ctr"/>
+            <a:endParaRPr lang="en-US" dirty="0"/>
+          </a:p>
+        </p:txBody>
+      </p:sp>
+    </p:spTree>
+    <p:extLst>
+      <p:ext uri="{BB962C8B-B14F-4D97-AF65-F5344CB8AC3E}">
+        <p14:creationId xmlns:p14="http://schemas.microsoft.com/office/powerpoint/2010/main" val="2946121286"/>
+      </p:ext>
+    </p:extLst>
+  </p:cSld>
+  <p:clrMapOvr>
+    <a:masterClrMapping/>
+  </p:clrMapOvr>
+  <p:timing>
+    <p:tnLst>
+      <p:par>
+        <p:cTn id="1" dur="indefinite" restart="never" nodeType="tmRoot"/>
+      </p:par>
+    </p:tnLst>
+  </p:timing>
+</p:sld>
+</file>
+
+<file path=ppt/slides/slide3.xml><?xml version="1.0" encoding="utf-8"?>
+<p:sld xmlns:a="http://schemas.openxmlformats.org/drawingml/2006/main" xmlns:r="http://schemas.openxmlformats.org/officeDocument/2006/relationships" xmlns:p="http://schemas.openxmlformats.org/presentationml/2006/main">
+  <p:cSld>
+    <p:spTree>
+      <p:nvGrpSpPr>
+        <p:cNvPr id="1" name=""/>
+        <p:cNvGrpSpPr/>
+        <p:nvPr/>
+      </p:nvGrpSpPr>
+      <p:grpSpPr>
+        <a:xfrm>
+          <a:off x="0" y="0"/>
+          <a:ext cx="0" cy="0"/>
+          <a:chOff x="0" y="0"/>
+          <a:chExt cx="0" cy="0"/>
+        </a:xfrm>
+      </p:grpSpPr>
+      <p:pic>
+        <p:nvPicPr>
+          <p:cNvPr id="4" name="Picture 3"/>
+          <p:cNvPicPr>
+            <a:picLocks noChangeAspect="1"/>
+          </p:cNvPicPr>
+          <p:nvPr/>
+        </p:nvPicPr>
+        <p:blipFill>
+          <a:blip r:embed="rId2"/>
+          <a:stretch>
+            <a:fillRect/>
+          </a:stretch>
+        </p:blipFill>
+        <p:spPr>
+          <a:xfrm>
+            <a:off x="0" y="0"/>
+            <a:ext cx="10506075" cy="6086475"/>
+          </a:xfrm>
+          <a:prstGeom prst="rect">
+            <a:avLst/>
+          </a:prstGeom>
+        </p:spPr>
+      </p:pic>
+      <p:pic>
+        <p:nvPicPr>
+          <p:cNvPr id="2" name="Content Placeholder 1"/>
+          <p:cNvPicPr>
+            <a:picLocks noGrp="1" noChangeAspect="1"/>
+          </p:cNvPicPr>
+          <p:nvPr>
+            <p:ph idx="1"/>
+          </p:nvPr>
+        </p:nvPicPr>
+        <p:blipFill>
+          <a:blip r:embed="rId3"/>
+          <a:stretch>
+            <a:fillRect/>
+          </a:stretch>
+        </p:blipFill>
+        <p:spPr>
+          <a:xfrm>
+            <a:off x="1685925" y="771525"/>
+            <a:ext cx="10506075" cy="6086475"/>
+          </a:xfrm>
+          <a:prstGeom prst="rect">
+            <a:avLst/>
+          </a:prstGeom>
+        </p:spPr>
+      </p:pic>
+      <p:sp>
+        <p:nvSpPr>
+          <p:cNvPr id="6" name="Rectangle 5"/>
+          <p:cNvSpPr/>
+          <p:nvPr/>
+        </p:nvSpPr>
+        <p:spPr>
+          <a:xfrm>
+            <a:off x="0" y="357052"/>
+            <a:ext cx="2490651" cy="235131"/>
+          </a:xfrm>
+          <a:prstGeom prst="rect">
+            <a:avLst/>
+          </a:prstGeom>
+          <a:solidFill>
+            <a:schemeClr val="accent4">
+              <a:alpha val="50000"/>
+            </a:schemeClr>
+          </a:solidFill>
+          <a:ln>
+            <a:noFill/>
+          </a:ln>
+        </p:spPr>
+        <p:style>
+          <a:lnRef idx="0">
+            <a:scrgbClr r="0" g="0" b="0"/>
+          </a:lnRef>
+          <a:fillRef idx="0">
+            <a:scrgbClr r="0" g="0" b="0"/>
+          </a:fillRef>
+          <a:effectRef idx="0">
+            <a:scrgbClr r="0" g="0" b="0"/>
+          </a:effectRef>
+          <a:fontRef idx="minor">
+            <a:schemeClr val="lt1"/>
+          </a:fontRef>
+        </p:style>
+        <p:txBody>
+          <a:bodyPr rtlCol="0" anchor="ctr"/>
+          <a:lstStyle/>
+          <a:p>
+            <a:pPr algn="ctr"/>
+            <a:endParaRPr lang="en-US" dirty="0"/>
+          </a:p>
+        </p:txBody>
+      </p:sp>
+    </p:spTree>
+    <p:extLst>
+      <p:ext uri="{BB962C8B-B14F-4D97-AF65-F5344CB8AC3E}">
+        <p14:creationId xmlns:p14="http://schemas.microsoft.com/office/powerpoint/2010/main" val="2197223615"/>
+      </p:ext>
+    </p:extLst>
+  </p:cSld>
+  <p:clrMapOvr>
+    <a:masterClrMapping/>
+  </p:clrMapOvr>
+  <p:timing>
+    <p:tnLst>
+      <p:par>
+        <p:cTn id="1" dur="indefinite" restart="never" nodeType="tmRoot"/>
+      </p:par>
+    </p:tnLst>
+  </p:timing>
+</p:sld>
+</file>
+
+<file path=ppt/slides/slide4.xml><?xml version="1.0" encoding="utf-8"?>
+<p:sld xmlns:a="http://schemas.openxmlformats.org/drawingml/2006/main" xmlns:r="http://schemas.openxmlformats.org/officeDocument/2006/relationships" xmlns:p="http://schemas.openxmlformats.org/presentationml/2006/main">
+  <p:cSld>
+    <p:spTree>
+      <p:nvGrpSpPr>
+        <p:cNvPr id="1" name=""/>
+        <p:cNvGrpSpPr/>
+        <p:nvPr/>
+      </p:nvGrpSpPr>
+      <p:grpSpPr>
+        <a:xfrm>
+          <a:off x="0" y="0"/>
+          <a:ext cx="0" cy="0"/>
+          <a:chOff x="0" y="0"/>
+          <a:chExt cx="0" cy="0"/>
+        </a:xfrm>
+      </p:grpSpPr>
+      <p:pic>
+        <p:nvPicPr>
+          <p:cNvPr id="4" name="Picture 3"/>
+          <p:cNvPicPr>
+            <a:picLocks noChangeAspect="1"/>
+          </p:cNvPicPr>
+          <p:nvPr/>
+        </p:nvPicPr>
+        <p:blipFill>
+          <a:blip r:embed="rId2"/>
+          <a:stretch>
+            <a:fillRect/>
+          </a:stretch>
+        </p:blipFill>
+        <p:spPr>
+          <a:xfrm>
+            <a:off x="0" y="0"/>
+            <a:ext cx="10506075" cy="6086475"/>
+          </a:xfrm>
+          <a:prstGeom prst="rect">
+            <a:avLst/>
+          </a:prstGeom>
+        </p:spPr>
+      </p:pic>
+      <p:pic>
+        <p:nvPicPr>
+          <p:cNvPr id="2" name="Content Placeholder 1"/>
+          <p:cNvPicPr>
+            <a:picLocks noGrp="1" noChangeAspect="1"/>
+          </p:cNvPicPr>
+          <p:nvPr>
+            <p:ph idx="1"/>
+          </p:nvPr>
+        </p:nvPicPr>
+        <p:blipFill>
+          <a:blip r:embed="rId3"/>
+          <a:stretch>
+            <a:fillRect/>
+          </a:stretch>
+        </p:blipFill>
+        <p:spPr>
+          <a:xfrm>
+            <a:off x="1685925" y="771525"/>
+            <a:ext cx="10506075" cy="6086475"/>
+          </a:xfrm>
+          <a:prstGeom prst="rect">
+            <a:avLst/>
+          </a:prstGeom>
+        </p:spPr>
+      </p:pic>
+      <p:sp>
+        <p:nvSpPr>
+          <p:cNvPr id="5" name="Rectangle 4"/>
+          <p:cNvSpPr/>
+          <p:nvPr/>
+        </p:nvSpPr>
+        <p:spPr>
+          <a:xfrm>
+            <a:off x="0" y="353514"/>
+            <a:ext cx="10328366" cy="418011"/>
+          </a:xfrm>
+          <a:prstGeom prst="rect">
+            <a:avLst/>
+          </a:prstGeom>
+          <a:solidFill>
+            <a:schemeClr val="accent4">
+              <a:alpha val="50000"/>
+            </a:schemeClr>
+          </a:solidFill>
+          <a:ln>
+            <a:noFill/>
+          </a:ln>
+        </p:spPr>
+        <p:style>
+          <a:lnRef idx="0">
+            <a:scrgbClr r="0" g="0" b="0"/>
+          </a:lnRef>
+          <a:fillRef idx="0">
+            <a:scrgbClr r="0" g="0" b="0"/>
+          </a:fillRef>
+          <a:effectRef idx="0">
+            <a:scrgbClr r="0" g="0" b="0"/>
+          </a:effectRef>
+          <a:fontRef idx="minor">
+            <a:schemeClr val="lt1"/>
+          </a:fontRef>
+        </p:style>
+        <p:txBody>
+          <a:bodyPr rtlCol="0" anchor="ctr"/>
+          <a:lstStyle/>
+          <a:p>
+            <a:pPr algn="ctr"/>
+            <a:endParaRPr lang="en-US" dirty="0"/>
+          </a:p>
+        </p:txBody>
+      </p:sp>
+    </p:spTree>
+    <p:extLst>
+      <p:ext uri="{BB962C8B-B14F-4D97-AF65-F5344CB8AC3E}">
+        <p14:creationId xmlns:p14="http://schemas.microsoft.com/office/powerpoint/2010/main" val="2465621180"/>
+      </p:ext>
+    </p:extLst>
+  </p:cSld>
+  <p:clrMapOvr>
+    <a:masterClrMapping/>
+  </p:clrMapOvr>
+  <p:timing>
+    <p:tnLst>
+      <p:par>
+        <p:cTn id="1" dur="indefinite" restart="never" nodeType="tmRoot"/>
+      </p:par>
+    </p:tnLst>
+  </p:timing>
+</p:sld>
+</file>
+
+<file path=ppt/slides/slide5.xml><?xml version="1.0" encoding="utf-8"?>
+<p:sld xmlns:a="http://schemas.openxmlformats.org/drawingml/2006/main" xmlns:r="http://schemas.openxmlformats.org/officeDocument/2006/relationships" xmlns:p="http://schemas.openxmlformats.org/presentationml/2006/main">
+  <p:cSld>
+    <p:spTree>
+      <p:nvGrpSpPr>
+        <p:cNvPr id="1" name=""/>
+        <p:cNvGrpSpPr/>
+        <p:nvPr/>
+      </p:nvGrpSpPr>
+      <p:grpSpPr>
+        <a:xfrm>
+          <a:off x="0" y="0"/>
+          <a:ext cx="0" cy="0"/>
+          <a:chOff x="0" y="0"/>
+          <a:chExt cx="0" cy="0"/>
+        </a:xfrm>
+      </p:grpSpPr>
+      <p:pic>
+        <p:nvPicPr>
+          <p:cNvPr id="2" name="Content Placeholder 1"/>
+          <p:cNvPicPr>
+            <a:picLocks noGrp="1" noChangeAspect="1"/>
+          </p:cNvPicPr>
+          <p:nvPr>
+            <p:ph idx="1"/>
+          </p:nvPr>
+        </p:nvPicPr>
+        <p:blipFill>
+          <a:blip r:embed="rId2"/>
+          <a:stretch>
+            <a:fillRect/>
+          </a:stretch>
+        </p:blipFill>
+        <p:spPr>
+          <a:xfrm>
+            <a:off x="842962" y="385762"/>
+            <a:ext cx="10506075" cy="6086475"/>
+          </a:xfrm>
+          <a:prstGeom prst="rect">
+            <a:avLst/>
+          </a:prstGeom>
+        </p:spPr>
+      </p:pic>
+      <p:sp>
+        <p:nvSpPr>
+          <p:cNvPr id="5" name="Rectangle 4"/>
+          <p:cNvSpPr/>
+          <p:nvPr/>
+        </p:nvSpPr>
+        <p:spPr>
+          <a:xfrm>
+            <a:off x="842962" y="748937"/>
+            <a:ext cx="10312718" cy="400594"/>
+          </a:xfrm>
+          <a:prstGeom prst="rect">
+            <a:avLst/>
+          </a:prstGeom>
+          <a:solidFill>
+            <a:schemeClr val="accent4">
+              <a:alpha val="50000"/>
+            </a:schemeClr>
+          </a:solidFill>
+          <a:ln>
+            <a:noFill/>
+          </a:ln>
+        </p:spPr>
+        <p:style>
+          <a:lnRef idx="0">
+            <a:scrgbClr r="0" g="0" b="0"/>
+          </a:lnRef>
+          <a:fillRef idx="0">
+            <a:scrgbClr r="0" g="0" b="0"/>
+          </a:fillRef>
+          <a:effectRef idx="0">
+            <a:scrgbClr r="0" g="0" b="0"/>
+          </a:effectRef>
+          <a:fontRef idx="minor">
+            <a:schemeClr val="lt1"/>
+          </a:fontRef>
+        </p:style>
+        <p:txBody>
+          <a:bodyPr rtlCol="0" anchor="ctr"/>
+          <a:lstStyle/>
+          <a:p>
+            <a:pPr algn="ctr"/>
+            <a:endParaRPr lang="en-US" dirty="0"/>
+          </a:p>
+        </p:txBody>
+      </p:sp>
+      <p:sp>
+        <p:nvSpPr>
+          <p:cNvPr id="6" name="Rectangle 5"/>
+          <p:cNvSpPr/>
+          <p:nvPr/>
+        </p:nvSpPr>
+        <p:spPr>
+          <a:xfrm>
+            <a:off x="842962" y="1149531"/>
+            <a:ext cx="8597129" cy="209006"/>
+          </a:xfrm>
+          <a:prstGeom prst="rect">
+            <a:avLst/>
+          </a:prstGeom>
+          <a:solidFill>
+            <a:schemeClr val="accent4">
+              <a:alpha val="50000"/>
+            </a:schemeClr>
+          </a:solidFill>
+          <a:ln>
+            <a:noFill/>
+          </a:ln>
+        </p:spPr>
+        <p:style>
+          <a:lnRef idx="0">
+            <a:scrgbClr r="0" g="0" b="0"/>
+          </a:lnRef>
+          <a:fillRef idx="0">
+            <a:scrgbClr r="0" g="0" b="0"/>
+          </a:fillRef>
+          <a:effectRef idx="0">
+            <a:scrgbClr r="0" g="0" b="0"/>
+          </a:effectRef>
+          <a:fontRef idx="minor">
+            <a:schemeClr val="lt1"/>
+          </a:fontRef>
+        </p:style>
+        <p:txBody>
+          <a:bodyPr rtlCol="0" anchor="ctr"/>
+          <a:lstStyle/>
+          <a:p>
+            <a:pPr algn="ctr"/>
+            <a:endParaRPr lang="en-US" dirty="0"/>
+          </a:p>
+        </p:txBody>
+      </p:sp>
+      <p:sp>
+        <p:nvSpPr>
+          <p:cNvPr id="7" name="Rectangle 6"/>
+          <p:cNvSpPr/>
+          <p:nvPr/>
+        </p:nvSpPr>
+        <p:spPr>
+          <a:xfrm>
+            <a:off x="842962" y="1532706"/>
+            <a:ext cx="6855415" cy="574767"/>
+          </a:xfrm>
+          <a:prstGeom prst="rect">
+            <a:avLst/>
+          </a:prstGeom>
+          <a:solidFill>
+            <a:schemeClr val="accent4">
+              <a:alpha val="50000"/>
+            </a:schemeClr>
+          </a:solidFill>
+          <a:ln>
+            <a:noFill/>
+          </a:ln>
+        </p:spPr>
+        <p:style>
+          <a:lnRef idx="0">
+            <a:scrgbClr r="0" g="0" b="0"/>
+          </a:lnRef>
+          <a:fillRef idx="0">
+            <a:scrgbClr r="0" g="0" b="0"/>
+          </a:fillRef>
+          <a:effectRef idx="0">
+            <a:scrgbClr r="0" g="0" b="0"/>
+          </a:effectRef>
+          <a:fontRef idx="minor">
+            <a:schemeClr val="lt1"/>
+          </a:fontRef>
+        </p:style>
+        <p:txBody>
+          <a:bodyPr rtlCol="0" anchor="ctr"/>
+          <a:lstStyle/>
+          <a:p>
+            <a:pPr algn="ctr"/>
+            <a:endParaRPr lang="en-US" dirty="0"/>
+          </a:p>
+        </p:txBody>
+      </p:sp>
+    </p:spTree>
+    <p:extLst>
+      <p:ext uri="{BB962C8B-B14F-4D97-AF65-F5344CB8AC3E}">
+        <p14:creationId xmlns:p14="http://schemas.microsoft.com/office/powerpoint/2010/main" val="2210577148"/>
       </p:ext>
     </p:extLst>
   </p:cSld>

</xml_diff>